<commit_message>
Witt og Siig slides(tekst) tilføjet
</commit_message>
<xml_diff>
--- a/Fremlæggelse/SmartFridge fremlæggelse.pptx
+++ b/Fremlæggelse/SmartFridge fremlæggelse.pptx
@@ -18,7 +18,7 @@
     <p:sldId id="260" r:id="rId6"/>
     <p:sldId id="261" r:id="rId7"/>
     <p:sldId id="262" r:id="rId8"/>
-    <p:sldId id="263" r:id="rId9"/>
+    <p:sldId id="264" r:id="rId9"/>
   </p:sldIdLst>
   <p:sldSz cx="9144000" cy="6858000" type="screen4x3"/>
   <p:notesSz cx="6797675" cy="9926638"/>
@@ -1542,7 +1542,7 @@
     </p:spTree>
     <p:extLst>
       <p:ext uri="{BB962C8B-B14F-4D97-AF65-F5344CB8AC3E}">
-        <p14:creationId xmlns:p14="http://schemas.microsoft.com/office/powerpoint/2010/main" val="3338804147"/>
+        <p14:creationId xmlns:p14="http://schemas.microsoft.com/office/powerpoint/2010/main" val="870952196"/>
       </p:ext>
     </p:extLst>
   </p:cSld>
@@ -2617,15 +2617,7 @@
                   <a:srgbClr val="0E133E"/>
                 </a:solidFill>
               </a:rPr>
-              <a:t> </a:t>
-            </a:r>
-            <a:r>
-              <a:rPr lang="en-US" sz="900" dirty="0" smtClean="0">
-                <a:solidFill>
-                  <a:srgbClr val="0E133E"/>
-                </a:solidFill>
-              </a:rPr>
-              <a:t>5</a:t>
+              <a:t> 5</a:t>
             </a:r>
             <a:endParaRPr lang="en-US" sz="900" dirty="0">
               <a:solidFill>
@@ -3500,9 +3492,26 @@
           <a:p>
             <a:r>
               <a:rPr lang="da-DK" dirty="0" smtClean="0"/>
+              <a:t>Problem</a:t>
+            </a:r>
+          </a:p>
+          <a:p>
+            <a:endParaRPr lang="da-DK" dirty="0" smtClean="0"/>
+          </a:p>
+          <a:p>
+            <a:r>
+              <a:rPr lang="da-DK" smtClean="0"/>
               <a:t>Vision</a:t>
             </a:r>
+          </a:p>
+          <a:p>
             <a:endParaRPr lang="da-DK" dirty="0"/>
+          </a:p>
+          <a:p>
+            <a:r>
+              <a:rPr lang="da-DK" dirty="0" smtClean="0"/>
+              <a:t>Produkt</a:t>
+            </a:r>
           </a:p>
         </p:txBody>
       </p:sp>
@@ -4070,6 +4079,30 @@
           <a:chExt cx="0" cy="0"/>
         </a:xfrm>
       </p:grpSpPr>
+      <p:pic>
+        <p:nvPicPr>
+          <p:cNvPr id="10" name="Picture 9"/>
+          <p:cNvPicPr>
+            <a:picLocks noChangeAspect="1"/>
+          </p:cNvPicPr>
+          <p:nvPr/>
+        </p:nvPicPr>
+        <p:blipFill>
+          <a:blip r:embed="rId3"/>
+          <a:stretch>
+            <a:fillRect/>
+          </a:stretch>
+        </p:blipFill>
+        <p:spPr>
+          <a:xfrm>
+            <a:off x="5414289" y="4684146"/>
+            <a:ext cx="3370936" cy="1892325"/>
+          </a:xfrm>
+          <a:prstGeom prst="rect">
+            <a:avLst/>
+          </a:prstGeom>
+        </p:spPr>
+      </p:pic>
       <p:sp>
         <p:nvSpPr>
           <p:cNvPr id="2" name="Title 1"/>
@@ -4103,27 +4136,105 @@
             <p:ph idx="1"/>
           </p:nvPr>
         </p:nvSpPr>
-        <p:spPr/>
+        <p:spPr>
+          <a:xfrm>
+            <a:off x="431801" y="2276873"/>
+            <a:ext cx="2916064" cy="2808312"/>
+          </a:xfrm>
+        </p:spPr>
         <p:txBody>
           <a:bodyPr/>
           <a:lstStyle/>
           <a:p>
             <a:r>
+              <a:rPr lang="da-DK" u="sng" dirty="0" err="1" smtClean="0"/>
+              <a:t>Acceptest</a:t>
+            </a:r>
+            <a:endParaRPr lang="da-DK" u="sng" dirty="0" smtClean="0"/>
+          </a:p>
+          <a:p>
+            <a:pPr marL="0" indent="0">
+              <a:buNone/>
+            </a:pPr>
+            <a:endParaRPr lang="da-DK" u="sng" dirty="0" smtClean="0"/>
+          </a:p>
+          <a:p>
+            <a:r>
+              <a:rPr lang="da-DK" u="sng" dirty="0" err="1" smtClean="0"/>
+              <a:t>Mo</a:t>
+            </a:r>
+            <a:r>
+              <a:rPr lang="da-DK" b="1" u="sng" dirty="0" err="1" smtClean="0"/>
+              <a:t>S</a:t>
+            </a:r>
+            <a:r>
+              <a:rPr lang="da-DK" u="sng" dirty="0" err="1" smtClean="0"/>
+              <a:t>CoW</a:t>
+            </a:r>
+            <a:endParaRPr lang="da-DK" u="sng" dirty="0" smtClean="0"/>
+          </a:p>
+          <a:p>
+            <a:pPr marL="0" indent="0">
+              <a:buNone/>
+            </a:pPr>
+            <a:endParaRPr lang="da-DK" u="sng" dirty="0" smtClean="0"/>
+          </a:p>
+          <a:p>
+            <a:r>
+              <a:rPr lang="da-DK" u="sng" dirty="0" smtClean="0"/>
+              <a:t>Produktet</a:t>
+            </a:r>
+            <a:r>
               <a:rPr lang="da-DK" dirty="0" smtClean="0"/>
-              <a:t>Fremtidig udvikling</a:t>
-            </a:r>
-          </a:p>
-          <a:p>
+              <a:t>	</a:t>
+            </a:r>
+          </a:p>
+          <a:p>
+            <a:pPr lvl="1"/>
             <a:r>
               <a:rPr lang="da-DK" dirty="0" smtClean="0"/>
-              <a:t>Projektstyringen</a:t>
-            </a:r>
-          </a:p>
-          <a:p>
+              <a:t>WPF</a:t>
+            </a:r>
+          </a:p>
+          <a:p>
+            <a:pPr lvl="2"/>
             <a:r>
               <a:rPr lang="da-DK" dirty="0" smtClean="0"/>
-              <a:t>Produktet</a:t>
-            </a:r>
+              <a:t>Implementering</a:t>
+            </a:r>
+          </a:p>
+          <a:p>
+            <a:pPr lvl="2"/>
+            <a:r>
+              <a:rPr lang="da-DK" dirty="0" smtClean="0"/>
+              <a:t>Test</a:t>
+            </a:r>
+          </a:p>
+          <a:p>
+            <a:pPr lvl="1"/>
+            <a:r>
+              <a:rPr lang="da-DK" dirty="0" smtClean="0"/>
+              <a:t>Web</a:t>
+            </a:r>
+          </a:p>
+          <a:p>
+            <a:pPr lvl="2"/>
+            <a:r>
+              <a:rPr lang="da-DK" dirty="0" smtClean="0"/>
+              <a:t>Implementering</a:t>
+            </a:r>
+          </a:p>
+          <a:p>
+            <a:pPr lvl="2"/>
+            <a:r>
+              <a:rPr lang="da-DK" dirty="0" smtClean="0"/>
+              <a:t>Test</a:t>
+            </a:r>
+          </a:p>
+          <a:p>
+            <a:pPr marL="0" indent="0">
+              <a:buNone/>
+            </a:pPr>
             <a:endParaRPr lang="da-DK" dirty="0"/>
           </a:p>
         </p:txBody>
@@ -4161,10 +4272,301 @@
           </a:p>
         </p:txBody>
       </p:sp>
+      <p:sp>
+        <p:nvSpPr>
+          <p:cNvPr id="5" name="Content Placeholder 2"/>
+          <p:cNvSpPr txBox="1">
+            <a:spLocks/>
+          </p:cNvSpPr>
+          <p:nvPr/>
+        </p:nvSpPr>
+        <p:spPr bwMode="auto">
+          <a:xfrm>
+            <a:off x="4632416" y="2276872"/>
+            <a:ext cx="2916064" cy="2808314"/>
+          </a:xfrm>
+          <a:prstGeom prst="rect">
+            <a:avLst/>
+          </a:prstGeom>
+          <a:noFill/>
+          <a:ln w="9525">
+            <a:noFill/>
+            <a:miter lim="800000"/>
+            <a:headEnd/>
+            <a:tailEnd/>
+          </a:ln>
+        </p:spPr>
+        <p:txBody>
+          <a:bodyPr vert="horz" wrap="square" lIns="0" tIns="0" rIns="0" bIns="0" numCol="1" anchor="t" anchorCtr="0" compatLnSpc="1">
+            <a:prstTxWarp prst="textNoShape">
+              <a:avLst/>
+            </a:prstTxWarp>
+          </a:bodyPr>
+          <a:lstStyle>
+            <a:lvl1pPr marL="174625" indent="-174625" algn="l" rtl="0" eaLnBrk="1" fontAlgn="base" hangingPunct="1">
+              <a:lnSpc>
+                <a:spcPts val="2100"/>
+              </a:lnSpc>
+              <a:spcBef>
+                <a:spcPct val="0"/>
+              </a:spcBef>
+              <a:spcAft>
+                <a:spcPct val="0"/>
+              </a:spcAft>
+              <a:buFont typeface="AU Passata" pitchFamily="34" charset="0"/>
+              <a:buChar char="›"/>
+              <a:defRPr baseline="0">
+                <a:solidFill>
+                  <a:srgbClr val="001E42"/>
+                </a:solidFill>
+                <a:latin typeface="+mn-lt"/>
+                <a:ea typeface="+mn-ea"/>
+                <a:cs typeface="+mn-cs"/>
+              </a:defRPr>
+            </a:lvl1pPr>
+            <a:lvl2pPr marL="360363" indent="-184150" algn="l" rtl="0" eaLnBrk="1" fontAlgn="base" hangingPunct="1">
+              <a:lnSpc>
+                <a:spcPct val="101000"/>
+              </a:lnSpc>
+              <a:spcBef>
+                <a:spcPct val="0"/>
+              </a:spcBef>
+              <a:spcAft>
+                <a:spcPct val="0"/>
+              </a:spcAft>
+              <a:buFont typeface="AU Passata" pitchFamily="34" charset="0"/>
+              <a:buChar char="›"/>
+              <a:defRPr sz="1400">
+                <a:solidFill>
+                  <a:srgbClr val="001E42"/>
+                </a:solidFill>
+                <a:latin typeface="+mn-lt"/>
+              </a:defRPr>
+            </a:lvl2pPr>
+            <a:lvl3pPr marL="544513" indent="-182563" algn="l" rtl="0" eaLnBrk="1" fontAlgn="base" hangingPunct="1">
+              <a:lnSpc>
+                <a:spcPct val="97000"/>
+              </a:lnSpc>
+              <a:spcBef>
+                <a:spcPct val="20000"/>
+              </a:spcBef>
+              <a:spcAft>
+                <a:spcPct val="0"/>
+              </a:spcAft>
+              <a:buFont typeface="AU Passata" pitchFamily="34" charset="0"/>
+              <a:buChar char="›"/>
+              <a:defRPr sz="1200">
+                <a:solidFill>
+                  <a:srgbClr val="001E42"/>
+                </a:solidFill>
+                <a:latin typeface="+mn-lt"/>
+              </a:defRPr>
+            </a:lvl3pPr>
+            <a:lvl4pPr marL="711200" indent="-165100" algn="l" rtl="0" eaLnBrk="1" fontAlgn="base" hangingPunct="1">
+              <a:spcBef>
+                <a:spcPct val="20000"/>
+              </a:spcBef>
+              <a:spcAft>
+                <a:spcPct val="0"/>
+              </a:spcAft>
+              <a:buFont typeface="AU Passata" pitchFamily="34" charset="0"/>
+              <a:buChar char="›"/>
+              <a:defRPr sz="1200">
+                <a:solidFill>
+                  <a:srgbClr val="001E42"/>
+                </a:solidFill>
+                <a:latin typeface="+mn-lt"/>
+              </a:defRPr>
+            </a:lvl4pPr>
+            <a:lvl5pPr marL="895350" indent="-176213" algn="l" rtl="0" eaLnBrk="1" fontAlgn="base" hangingPunct="1">
+              <a:spcBef>
+                <a:spcPct val="20000"/>
+              </a:spcBef>
+              <a:spcAft>
+                <a:spcPct val="0"/>
+              </a:spcAft>
+              <a:buFont typeface="AU Passata" pitchFamily="34" charset="0"/>
+              <a:buChar char="›"/>
+              <a:defRPr sz="1200">
+                <a:solidFill>
+                  <a:srgbClr val="001E42"/>
+                </a:solidFill>
+                <a:latin typeface="+mn-lt"/>
+              </a:defRPr>
+            </a:lvl5pPr>
+            <a:lvl6pPr marL="1352550" indent="-176213" algn="l" rtl="0" eaLnBrk="1" fontAlgn="base" hangingPunct="1">
+              <a:spcBef>
+                <a:spcPct val="20000"/>
+              </a:spcBef>
+              <a:spcAft>
+                <a:spcPct val="0"/>
+              </a:spcAft>
+              <a:buFont typeface="AU Passata" pitchFamily="34" charset="0"/>
+              <a:buChar char="›"/>
+              <a:defRPr sz="1200">
+                <a:solidFill>
+                  <a:schemeClr val="bg2"/>
+                </a:solidFill>
+                <a:latin typeface="+mn-lt"/>
+              </a:defRPr>
+            </a:lvl6pPr>
+            <a:lvl7pPr marL="1809750" indent="-176213" algn="l" rtl="0" eaLnBrk="1" fontAlgn="base" hangingPunct="1">
+              <a:spcBef>
+                <a:spcPct val="20000"/>
+              </a:spcBef>
+              <a:spcAft>
+                <a:spcPct val="0"/>
+              </a:spcAft>
+              <a:buFont typeface="AU Passata" pitchFamily="34" charset="0"/>
+              <a:buChar char="›"/>
+              <a:defRPr sz="1200">
+                <a:solidFill>
+                  <a:schemeClr val="bg2"/>
+                </a:solidFill>
+                <a:latin typeface="+mn-lt"/>
+              </a:defRPr>
+            </a:lvl7pPr>
+            <a:lvl8pPr marL="2266950" indent="-176213" algn="l" rtl="0" eaLnBrk="1" fontAlgn="base" hangingPunct="1">
+              <a:spcBef>
+                <a:spcPct val="20000"/>
+              </a:spcBef>
+              <a:spcAft>
+                <a:spcPct val="0"/>
+              </a:spcAft>
+              <a:buFont typeface="AU Passata" pitchFamily="34" charset="0"/>
+              <a:buChar char="›"/>
+              <a:defRPr sz="1200">
+                <a:solidFill>
+                  <a:schemeClr val="bg2"/>
+                </a:solidFill>
+                <a:latin typeface="+mn-lt"/>
+              </a:defRPr>
+            </a:lvl8pPr>
+            <a:lvl9pPr marL="2724150" indent="-176213" algn="l" rtl="0" eaLnBrk="1" fontAlgn="base" hangingPunct="1">
+              <a:spcBef>
+                <a:spcPct val="20000"/>
+              </a:spcBef>
+              <a:spcAft>
+                <a:spcPct val="0"/>
+              </a:spcAft>
+              <a:buFont typeface="AU Passata" pitchFamily="34" charset="0"/>
+              <a:buChar char="›"/>
+              <a:defRPr sz="1200">
+                <a:solidFill>
+                  <a:schemeClr val="bg2"/>
+                </a:solidFill>
+                <a:latin typeface="+mn-lt"/>
+              </a:defRPr>
+            </a:lvl9pPr>
+          </a:lstStyle>
+          <a:p>
+            <a:r>
+              <a:rPr lang="da-DK" sz="1800" u="sng" kern="0" dirty="0" smtClean="0"/>
+              <a:t>Fremtidig udvikling</a:t>
+            </a:r>
+          </a:p>
+          <a:p>
+            <a:pPr lvl="1"/>
+            <a:r>
+              <a:rPr lang="da-DK" kern="0" dirty="0" smtClean="0"/>
+              <a:t>WPF</a:t>
+            </a:r>
+          </a:p>
+          <a:p>
+            <a:pPr lvl="2"/>
+            <a:r>
+              <a:rPr lang="da-DK" kern="0" dirty="0" smtClean="0"/>
+              <a:t>User </a:t>
+            </a:r>
+            <a:r>
+              <a:rPr lang="da-DK" kern="0" dirty="0" err="1" smtClean="0"/>
+              <a:t>controls</a:t>
+            </a:r>
+            <a:endParaRPr lang="da-DK" kern="0" dirty="0" smtClean="0"/>
+          </a:p>
+          <a:p>
+            <a:pPr lvl="1"/>
+            <a:r>
+              <a:rPr lang="da-DK" kern="0" dirty="0" smtClean="0"/>
+              <a:t>Web</a:t>
+            </a:r>
+          </a:p>
+          <a:p>
+            <a:pPr lvl="2"/>
+            <a:r>
+              <a:rPr lang="da-DK" kern="0" dirty="0" smtClean="0"/>
+              <a:t>MVC</a:t>
+            </a:r>
+          </a:p>
+          <a:p>
+            <a:pPr lvl="2"/>
+            <a:endParaRPr lang="da-DK" kern="0" dirty="0" smtClean="0"/>
+          </a:p>
+          <a:p>
+            <a:r>
+              <a:rPr lang="da-DK" sz="1800" u="sng" kern="0" dirty="0" smtClean="0"/>
+              <a:t>Projektstyringen</a:t>
+            </a:r>
+          </a:p>
+          <a:p>
+            <a:pPr lvl="1"/>
+            <a:r>
+              <a:rPr lang="da-DK" kern="0" dirty="0" smtClean="0"/>
+              <a:t>Arbejdsfordeling</a:t>
+            </a:r>
+          </a:p>
+          <a:p>
+            <a:pPr lvl="1"/>
+            <a:r>
+              <a:rPr lang="da-DK" kern="0" dirty="0" smtClean="0"/>
+              <a:t>Agil</a:t>
+            </a:r>
+          </a:p>
+          <a:p>
+            <a:pPr lvl="1"/>
+            <a:r>
+              <a:rPr lang="da-DK" kern="0" dirty="0" smtClean="0"/>
+              <a:t>Git &amp; </a:t>
+            </a:r>
+            <a:r>
+              <a:rPr lang="da-DK" kern="0" dirty="0" err="1" smtClean="0"/>
+              <a:t>Jenkins</a:t>
+            </a:r>
+            <a:endParaRPr lang="da-DK" kern="0" dirty="0" smtClean="0"/>
+          </a:p>
+          <a:p>
+            <a:endParaRPr lang="da-DK" sz="1800" kern="0" dirty="0"/>
+          </a:p>
+        </p:txBody>
+      </p:sp>
+      <p:pic>
+        <p:nvPicPr>
+          <p:cNvPr id="9" name="Picture 8"/>
+          <p:cNvPicPr>
+            <a:picLocks noChangeAspect="1"/>
+          </p:cNvPicPr>
+          <p:nvPr/>
+        </p:nvPicPr>
+        <p:blipFill>
+          <a:blip r:embed="rId4"/>
+          <a:stretch>
+            <a:fillRect/>
+          </a:stretch>
+        </p:blipFill>
+        <p:spPr>
+          <a:xfrm>
+            <a:off x="431800" y="5725361"/>
+            <a:ext cx="4776247" cy="851110"/>
+          </a:xfrm>
+          <a:prstGeom prst="rect">
+            <a:avLst/>
+          </a:prstGeom>
+        </p:spPr>
+      </p:pic>
     </p:spTree>
     <p:extLst>
       <p:ext uri="{BB962C8B-B14F-4D97-AF65-F5344CB8AC3E}">
-        <p14:creationId xmlns:p14="http://schemas.microsoft.com/office/powerpoint/2010/main" val="915014740"/>
+        <p14:creationId xmlns:p14="http://schemas.microsoft.com/office/powerpoint/2010/main" val="3213339505"/>
       </p:ext>
     </p:extLst>
   </p:cSld>

</xml_diff>

<commit_message>
Tilføjelse af Stuff's slide
</commit_message>
<xml_diff>
--- a/Fremlæggelse/SmartFridge fremlæggelse.pptx
+++ b/Fremlæggelse/SmartFridge fremlæggelse.pptx
@@ -16,7 +16,7 @@
     <p:sldId id="258" r:id="rId4"/>
     <p:sldId id="259" r:id="rId5"/>
     <p:sldId id="260" r:id="rId6"/>
-    <p:sldId id="261" r:id="rId7"/>
+    <p:sldId id="265" r:id="rId7"/>
     <p:sldId id="262" r:id="rId8"/>
     <p:sldId id="264" r:id="rId9"/>
   </p:sldIdLst>
@@ -1354,7 +1354,7 @@
     </p:spTree>
     <p:extLst>
       <p:ext uri="{BB962C8B-B14F-4D97-AF65-F5344CB8AC3E}">
-        <p14:creationId xmlns:p14="http://schemas.microsoft.com/office/powerpoint/2010/main" val="2019489416"/>
+        <p14:creationId xmlns:p14="http://schemas.microsoft.com/office/powerpoint/2010/main" val="437939593"/>
       </p:ext>
     </p:extLst>
   </p:cSld>
@@ -1693,7 +1693,7 @@
                   <a:schemeClr val="bg1"/>
                 </a:solidFill>
               </a:rPr>
-              <a:t>27 June 2015</a:t>
+              <a:t>28 June 2015</a:t>
             </a:fld>
             <a:endParaRPr lang="da-DK" sz="900" dirty="0">
               <a:solidFill>
@@ -2719,7 +2719,7 @@
                   <a:srgbClr val="0E133E"/>
                 </a:solidFill>
               </a:rPr>
-              <a:t>27 June 2015</a:t>
+              <a:t>28 June 2015</a:t>
             </a:fld>
             <a:endParaRPr lang="da-DK" sz="900" dirty="0">
               <a:solidFill>
@@ -3886,8 +3886,158 @@
           <a:lstStyle/>
           <a:p>
             <a:r>
+              <a:rPr lang="da-DK" dirty="0" err="1" smtClean="0"/>
+              <a:t>Fridge</a:t>
+            </a:r>
+            <a:r>
+              <a:rPr lang="da-DK" dirty="0" smtClean="0"/>
+              <a:t> </a:t>
+            </a:r>
+            <a:r>
+              <a:rPr lang="da-DK" dirty="0" err="1" smtClean="0"/>
+              <a:t>app</a:t>
+            </a:r>
+            <a:endParaRPr lang="da-DK" dirty="0" smtClean="0"/>
+          </a:p>
+          <a:p>
+            <a:pPr lvl="1"/>
+            <a:r>
+              <a:rPr lang="da-DK" dirty="0" err="1" smtClean="0"/>
+              <a:t>Layered</a:t>
+            </a:r>
+            <a:endParaRPr lang="da-DK" dirty="0" smtClean="0"/>
+          </a:p>
+          <a:p>
+            <a:pPr lvl="2"/>
+            <a:r>
+              <a:rPr lang="da-DK" dirty="0" smtClean="0"/>
+              <a:t>Application </a:t>
+            </a:r>
+            <a:r>
+              <a:rPr lang="da-DK" dirty="0" err="1" smtClean="0"/>
+              <a:t>Layer</a:t>
+            </a:r>
+            <a:endParaRPr lang="da-DK" dirty="0" smtClean="0"/>
+          </a:p>
+          <a:p>
+            <a:pPr lvl="2"/>
+            <a:r>
+              <a:rPr lang="da-DK" dirty="0" smtClean="0"/>
+              <a:t>Business </a:t>
+            </a:r>
+            <a:r>
+              <a:rPr lang="da-DK" dirty="0" err="1" smtClean="0"/>
+              <a:t>Logic</a:t>
+            </a:r>
+            <a:r>
+              <a:rPr lang="da-DK" dirty="0" smtClean="0"/>
+              <a:t> </a:t>
+            </a:r>
+            <a:r>
+              <a:rPr lang="da-DK" dirty="0" err="1" smtClean="0"/>
+              <a:t>Layer</a:t>
+            </a:r>
+            <a:endParaRPr lang="da-DK" dirty="0" smtClean="0"/>
+          </a:p>
+          <a:p>
+            <a:pPr lvl="2"/>
+            <a:r>
+              <a:rPr lang="da-DK" dirty="0" smtClean="0"/>
+              <a:t>Data Access </a:t>
+            </a:r>
+            <a:r>
+              <a:rPr lang="da-DK" dirty="0" err="1" smtClean="0"/>
+              <a:t>Layer</a:t>
+            </a:r>
+            <a:endParaRPr lang="da-DK" dirty="0"/>
+          </a:p>
+          <a:p>
+            <a:endParaRPr lang="da-DK" dirty="0" smtClean="0"/>
+          </a:p>
+          <a:p>
+            <a:r>
+              <a:rPr lang="da-DK" dirty="0" smtClean="0"/>
+              <a:t>Web </a:t>
+            </a:r>
+            <a:r>
+              <a:rPr lang="da-DK" dirty="0" err="1" smtClean="0"/>
+              <a:t>app</a:t>
+            </a:r>
+            <a:endParaRPr lang="da-DK" dirty="0" smtClean="0"/>
+          </a:p>
+          <a:p>
+            <a:pPr lvl="1"/>
+            <a:r>
+              <a:rPr lang="da-DK" dirty="0" smtClean="0"/>
+              <a:t>ASP.NET MVC</a:t>
+            </a:r>
+          </a:p>
+          <a:p>
+            <a:pPr lvl="2"/>
+            <a:r>
+              <a:rPr lang="da-DK" dirty="0" smtClean="0"/>
+              <a:t>Genbrug af DAL</a:t>
+            </a:r>
+          </a:p>
+          <a:p>
+            <a:pPr lvl="2"/>
+            <a:r>
+              <a:rPr lang="da-DK" dirty="0" smtClean="0"/>
+              <a:t>Ikke helt efter bogen</a:t>
+            </a:r>
+          </a:p>
+          <a:p>
+            <a:endParaRPr lang="da-DK" dirty="0"/>
+          </a:p>
+          <a:p>
+            <a:r>
+              <a:rPr lang="da-DK" dirty="0" smtClean="0"/>
+              <a:t>Databehandling</a:t>
+            </a:r>
+          </a:p>
+          <a:p>
+            <a:pPr lvl="1"/>
+            <a:r>
+              <a:rPr lang="da-DK" dirty="0" err="1" smtClean="0"/>
+              <a:t>GoF</a:t>
+            </a:r>
+            <a:r>
+              <a:rPr lang="da-DK" dirty="0" smtClean="0"/>
+              <a:t> Repository Pattern</a:t>
+            </a:r>
+          </a:p>
+          <a:p>
+            <a:pPr lvl="1"/>
+            <a:r>
+              <a:rPr lang="da-DK" dirty="0" err="1"/>
+              <a:t>GoF</a:t>
+            </a:r>
+            <a:r>
+              <a:rPr lang="da-DK" dirty="0"/>
+              <a:t> </a:t>
+            </a:r>
+            <a:r>
+              <a:rPr lang="da-DK" dirty="0" err="1"/>
+              <a:t>Façade</a:t>
+            </a:r>
+            <a:r>
+              <a:rPr lang="da-DK" dirty="0"/>
+              <a:t> </a:t>
+            </a:r>
+            <a:r>
               <a:rPr lang="da-DK" dirty="0" smtClean="0"/>
               <a:t>Pattern</a:t>
+            </a:r>
+          </a:p>
+          <a:p>
+            <a:pPr lvl="2"/>
+            <a:r>
+              <a:rPr lang="da-DK" dirty="0" smtClean="0"/>
+              <a:t>Kun på web </a:t>
+            </a:r>
+            <a:r>
+              <a:rPr lang="da-DK" dirty="0" err="1" smtClean="0"/>
+              <a:t>app</a:t>
             </a:r>
             <a:endParaRPr lang="da-DK" dirty="0"/>
           </a:p>
@@ -3926,10 +4076,145 @@
           </a:p>
         </p:txBody>
       </p:sp>
+      <p:sp>
+        <p:nvSpPr>
+          <p:cNvPr id="7" name="Rectangle 4"/>
+          <p:cNvSpPr>
+            <a:spLocks noChangeArrowheads="1"/>
+          </p:cNvSpPr>
+          <p:nvPr/>
+        </p:nvSpPr>
+        <p:spPr bwMode="auto">
+          <a:xfrm>
+            <a:off x="4437063" y="1893600"/>
+            <a:ext cx="9144000" cy="0"/>
+          </a:xfrm>
+          <a:prstGeom prst="rect">
+            <a:avLst/>
+          </a:prstGeom>
+          <a:noFill/>
+          <a:ln>
+            <a:noFill/>
+          </a:ln>
+          <a:effectLst/>
+          <a:extLst>
+            <a:ext uri="{909E8E84-426E-40DD-AFC4-6F175D3DCCD1}">
+              <a14:hiddenFill xmlns:a14="http://schemas.microsoft.com/office/drawing/2010/main">
+                <a:solidFill>
+                  <a:schemeClr val="accent1"/>
+                </a:solidFill>
+              </a14:hiddenFill>
+            </a:ext>
+            <a:ext uri="{91240B29-F687-4F45-9708-019B960494DF}">
+              <a14:hiddenLine xmlns:a14="http://schemas.microsoft.com/office/drawing/2010/main" w="9525">
+                <a:solidFill>
+                  <a:schemeClr val="tx1"/>
+                </a:solidFill>
+                <a:miter lim="800000"/>
+                <a:headEnd/>
+                <a:tailEnd/>
+              </a14:hiddenLine>
+            </a:ext>
+            <a:ext uri="{AF507438-7753-43E0-B8FC-AC1667EBCBE1}">
+              <a14:hiddenEffects xmlns:a14="http://schemas.microsoft.com/office/drawing/2010/main">
+                <a:effectLst>
+                  <a:outerShdw dist="35921" dir="2700000" algn="ctr" rotWithShape="0">
+                    <a:schemeClr val="bg2"/>
+                  </a:outerShdw>
+                </a:effectLst>
+              </a14:hiddenEffects>
+            </a:ext>
+          </a:extLst>
+        </p:spPr>
+        <p:txBody>
+          <a:bodyPr vert="horz" wrap="none" lIns="91440" tIns="45720" rIns="91440" bIns="45720" numCol="1" anchor="ctr" anchorCtr="0" compatLnSpc="1">
+            <a:prstTxWarp prst="textNoShape">
+              <a:avLst/>
+            </a:prstTxWarp>
+            <a:spAutoFit/>
+          </a:bodyPr>
+          <a:lstStyle/>
+          <a:p>
+            <a:endParaRPr lang="da-DK"/>
+          </a:p>
+        </p:txBody>
+      </p:sp>
+      <p:graphicFrame>
+        <p:nvGraphicFramePr>
+          <p:cNvPr id="8" name="Objekt 7"/>
+          <p:cNvGraphicFramePr>
+            <a:graphicFrameLocks noChangeAspect="1"/>
+          </p:cNvGraphicFramePr>
+          <p:nvPr>
+            <p:extLst/>
+          </p:nvPr>
+        </p:nvGraphicFramePr>
+        <p:xfrm>
+          <a:off x="3955392" y="2060848"/>
+          <a:ext cx="4343400" cy="3457575"/>
+        </p:xfrm>
+        <a:graphic>
+          <a:graphicData uri="http://schemas.openxmlformats.org/presentationml/2006/ole">
+            <mc:AlternateContent xmlns:mc="http://schemas.openxmlformats.org/markup-compatibility/2006">
+              <mc:Choice xmlns:v="urn:schemas-microsoft-com:vml" Requires="v">
+                <p:oleObj spid="_x0000_s1026" name="Visio" r:id="rId5" imgW="4347093" imgH="3669238" progId="Visio.Drawing.15">
+                  <p:embed/>
+                </p:oleObj>
+              </mc:Choice>
+              <mc:Fallback>
+                <p:oleObj name="Visio" r:id="rId5" imgW="4347093" imgH="3669238" progId="Visio.Drawing.15">
+                  <p:embed/>
+                  <p:pic>
+                    <p:nvPicPr>
+                      <p:cNvPr id="0" name=""/>
+                      <p:cNvPicPr>
+                        <a:picLocks noChangeAspect="1" noChangeArrowheads="1"/>
+                      </p:cNvPicPr>
+                      <p:nvPr/>
+                    </p:nvPicPr>
+                    <p:blipFill>
+                      <a:blip r:embed="rId6">
+                        <a:extLst>
+                          <a:ext uri="{28A0092B-C50C-407E-A947-70E740481C1C}">
+                            <a14:useLocalDpi xmlns:a14="http://schemas.microsoft.com/office/drawing/2010/main" val="0"/>
+                          </a:ext>
+                        </a:extLst>
+                      </a:blip>
+                      <a:srcRect b="5869"/>
+                      <a:stretch>
+                        <a:fillRect/>
+                      </a:stretch>
+                    </p:blipFill>
+                    <p:spPr bwMode="auto">
+                      <a:xfrm>
+                        <a:off x="3955392" y="2060848"/>
+                        <a:ext cx="4343400" cy="3457575"/>
+                      </a:xfrm>
+                      <a:prstGeom prst="rect">
+                        <a:avLst/>
+                      </a:prstGeom>
+                      <a:noFill/>
+                      <a:extLst>
+                        <a:ext uri="{909E8E84-426E-40DD-AFC4-6F175D3DCCD1}">
+                          <a14:hiddenFill xmlns:a14="http://schemas.microsoft.com/office/drawing/2010/main">
+                            <a:solidFill>
+                              <a:srgbClr val="FFFFFF"/>
+                            </a:solidFill>
+                          </a14:hiddenFill>
+                        </a:ext>
+                      </a:extLst>
+                    </p:spPr>
+                  </p:pic>
+                </p:oleObj>
+              </mc:Fallback>
+            </mc:AlternateContent>
+          </a:graphicData>
+        </a:graphic>
+      </p:graphicFrame>
     </p:spTree>
     <p:extLst>
       <p:ext uri="{BB962C8B-B14F-4D97-AF65-F5344CB8AC3E}">
-        <p14:creationId xmlns:p14="http://schemas.microsoft.com/office/powerpoint/2010/main" val="445197610"/>
+        <p14:creationId xmlns:p14="http://schemas.microsoft.com/office/powerpoint/2010/main" val="3549135714"/>
       </p:ext>
     </p:extLst>
   </p:cSld>
@@ -3939,7 +4224,514 @@
   <p:timing>
     <p:tnLst>
       <p:par>
-        <p:cTn id="1" dur="indefinite" restart="never" nodeType="tmRoot"/>
+        <p:cTn id="1" dur="indefinite" restart="never" nodeType="tmRoot">
+          <p:childTnLst>
+            <p:seq concurrent="1" nextAc="seek">
+              <p:cTn id="2" dur="indefinite" nodeType="mainSeq">
+                <p:childTnLst>
+                  <p:par>
+                    <p:cTn id="3" fill="hold">
+                      <p:stCondLst>
+                        <p:cond delay="indefinite"/>
+                      </p:stCondLst>
+                      <p:childTnLst>
+                        <p:par>
+                          <p:cTn id="4" fill="hold">
+                            <p:stCondLst>
+                              <p:cond delay="0"/>
+                            </p:stCondLst>
+                            <p:childTnLst>
+                              <p:par>
+                                <p:cTn id="5" presetID="10" presetClass="entr" presetSubtype="0" fill="hold" nodeType="clickEffect">
+                                  <p:stCondLst>
+                                    <p:cond delay="0"/>
+                                  </p:stCondLst>
+                                  <p:childTnLst>
+                                    <p:set>
+                                      <p:cBhvr>
+                                        <p:cTn id="6" dur="1" fill="hold">
+                                          <p:stCondLst>
+                                            <p:cond delay="0"/>
+                                          </p:stCondLst>
+                                        </p:cTn>
+                                        <p:tgtEl>
+                                          <p:spTgt spid="3">
+                                            <p:txEl>
+                                              <p:pRg st="1" end="1"/>
+                                            </p:txEl>
+                                          </p:spTgt>
+                                        </p:tgtEl>
+                                        <p:attrNameLst>
+                                          <p:attrName>style.visibility</p:attrName>
+                                        </p:attrNameLst>
+                                      </p:cBhvr>
+                                      <p:to>
+                                        <p:strVal val="visible"/>
+                                      </p:to>
+                                    </p:set>
+                                    <p:animEffect transition="in" filter="fade">
+                                      <p:cBhvr>
+                                        <p:cTn id="7" dur="500"/>
+                                        <p:tgtEl>
+                                          <p:spTgt spid="3">
+                                            <p:txEl>
+                                              <p:pRg st="1" end="1"/>
+                                            </p:txEl>
+                                          </p:spTgt>
+                                        </p:tgtEl>
+                                      </p:cBhvr>
+                                    </p:animEffect>
+                                  </p:childTnLst>
+                                </p:cTn>
+                              </p:par>
+                              <p:par>
+                                <p:cTn id="8" presetID="10" presetClass="entr" presetSubtype="0" fill="hold" nodeType="withEffect">
+                                  <p:stCondLst>
+                                    <p:cond delay="0"/>
+                                  </p:stCondLst>
+                                  <p:childTnLst>
+                                    <p:set>
+                                      <p:cBhvr>
+                                        <p:cTn id="9" dur="1" fill="hold">
+                                          <p:stCondLst>
+                                            <p:cond delay="0"/>
+                                          </p:stCondLst>
+                                        </p:cTn>
+                                        <p:tgtEl>
+                                          <p:spTgt spid="3">
+                                            <p:txEl>
+                                              <p:pRg st="2" end="2"/>
+                                            </p:txEl>
+                                          </p:spTgt>
+                                        </p:tgtEl>
+                                        <p:attrNameLst>
+                                          <p:attrName>style.visibility</p:attrName>
+                                        </p:attrNameLst>
+                                      </p:cBhvr>
+                                      <p:to>
+                                        <p:strVal val="visible"/>
+                                      </p:to>
+                                    </p:set>
+                                    <p:animEffect transition="in" filter="fade">
+                                      <p:cBhvr>
+                                        <p:cTn id="10" dur="500"/>
+                                        <p:tgtEl>
+                                          <p:spTgt spid="3">
+                                            <p:txEl>
+                                              <p:pRg st="2" end="2"/>
+                                            </p:txEl>
+                                          </p:spTgt>
+                                        </p:tgtEl>
+                                      </p:cBhvr>
+                                    </p:animEffect>
+                                  </p:childTnLst>
+                                </p:cTn>
+                              </p:par>
+                              <p:par>
+                                <p:cTn id="11" presetID="10" presetClass="entr" presetSubtype="0" fill="hold" nodeType="withEffect">
+                                  <p:stCondLst>
+                                    <p:cond delay="0"/>
+                                  </p:stCondLst>
+                                  <p:childTnLst>
+                                    <p:set>
+                                      <p:cBhvr>
+                                        <p:cTn id="12" dur="1" fill="hold">
+                                          <p:stCondLst>
+                                            <p:cond delay="0"/>
+                                          </p:stCondLst>
+                                        </p:cTn>
+                                        <p:tgtEl>
+                                          <p:spTgt spid="3">
+                                            <p:txEl>
+                                              <p:pRg st="3" end="3"/>
+                                            </p:txEl>
+                                          </p:spTgt>
+                                        </p:tgtEl>
+                                        <p:attrNameLst>
+                                          <p:attrName>style.visibility</p:attrName>
+                                        </p:attrNameLst>
+                                      </p:cBhvr>
+                                      <p:to>
+                                        <p:strVal val="visible"/>
+                                      </p:to>
+                                    </p:set>
+                                    <p:animEffect transition="in" filter="fade">
+                                      <p:cBhvr>
+                                        <p:cTn id="13" dur="500"/>
+                                        <p:tgtEl>
+                                          <p:spTgt spid="3">
+                                            <p:txEl>
+                                              <p:pRg st="3" end="3"/>
+                                            </p:txEl>
+                                          </p:spTgt>
+                                        </p:tgtEl>
+                                      </p:cBhvr>
+                                    </p:animEffect>
+                                  </p:childTnLst>
+                                </p:cTn>
+                              </p:par>
+                              <p:par>
+                                <p:cTn id="14" presetID="10" presetClass="entr" presetSubtype="0" fill="hold" nodeType="withEffect">
+                                  <p:stCondLst>
+                                    <p:cond delay="0"/>
+                                  </p:stCondLst>
+                                  <p:childTnLst>
+                                    <p:set>
+                                      <p:cBhvr>
+                                        <p:cTn id="15" dur="1" fill="hold">
+                                          <p:stCondLst>
+                                            <p:cond delay="0"/>
+                                          </p:stCondLst>
+                                        </p:cTn>
+                                        <p:tgtEl>
+                                          <p:spTgt spid="3">
+                                            <p:txEl>
+                                              <p:pRg st="4" end="4"/>
+                                            </p:txEl>
+                                          </p:spTgt>
+                                        </p:tgtEl>
+                                        <p:attrNameLst>
+                                          <p:attrName>style.visibility</p:attrName>
+                                        </p:attrNameLst>
+                                      </p:cBhvr>
+                                      <p:to>
+                                        <p:strVal val="visible"/>
+                                      </p:to>
+                                    </p:set>
+                                    <p:animEffect transition="in" filter="fade">
+                                      <p:cBhvr>
+                                        <p:cTn id="16" dur="500"/>
+                                        <p:tgtEl>
+                                          <p:spTgt spid="3">
+                                            <p:txEl>
+                                              <p:pRg st="4" end="4"/>
+                                            </p:txEl>
+                                          </p:spTgt>
+                                        </p:tgtEl>
+                                      </p:cBhvr>
+                                    </p:animEffect>
+                                  </p:childTnLst>
+                                </p:cTn>
+                              </p:par>
+                            </p:childTnLst>
+                          </p:cTn>
+                        </p:par>
+                      </p:childTnLst>
+                    </p:cTn>
+                  </p:par>
+                  <p:par>
+                    <p:cTn id="17" fill="hold">
+                      <p:stCondLst>
+                        <p:cond delay="indefinite"/>
+                      </p:stCondLst>
+                      <p:childTnLst>
+                        <p:par>
+                          <p:cTn id="18" fill="hold">
+                            <p:stCondLst>
+                              <p:cond delay="0"/>
+                            </p:stCondLst>
+                            <p:childTnLst>
+                              <p:par>
+                                <p:cTn id="19" presetID="10" presetClass="entr" presetSubtype="0" fill="hold" nodeType="clickEffect">
+                                  <p:stCondLst>
+                                    <p:cond delay="0"/>
+                                  </p:stCondLst>
+                                  <p:childTnLst>
+                                    <p:set>
+                                      <p:cBhvr>
+                                        <p:cTn id="20" dur="1" fill="hold">
+                                          <p:stCondLst>
+                                            <p:cond delay="0"/>
+                                          </p:stCondLst>
+                                        </p:cTn>
+                                        <p:tgtEl>
+                                          <p:spTgt spid="3">
+                                            <p:txEl>
+                                              <p:pRg st="7" end="7"/>
+                                            </p:txEl>
+                                          </p:spTgt>
+                                        </p:tgtEl>
+                                        <p:attrNameLst>
+                                          <p:attrName>style.visibility</p:attrName>
+                                        </p:attrNameLst>
+                                      </p:cBhvr>
+                                      <p:to>
+                                        <p:strVal val="visible"/>
+                                      </p:to>
+                                    </p:set>
+                                    <p:animEffect transition="in" filter="fade">
+                                      <p:cBhvr>
+                                        <p:cTn id="21" dur="500"/>
+                                        <p:tgtEl>
+                                          <p:spTgt spid="3">
+                                            <p:txEl>
+                                              <p:pRg st="7" end="7"/>
+                                            </p:txEl>
+                                          </p:spTgt>
+                                        </p:tgtEl>
+                                      </p:cBhvr>
+                                    </p:animEffect>
+                                  </p:childTnLst>
+                                </p:cTn>
+                              </p:par>
+                              <p:par>
+                                <p:cTn id="22" presetID="10" presetClass="entr" presetSubtype="0" fill="hold" nodeType="withEffect">
+                                  <p:stCondLst>
+                                    <p:cond delay="0"/>
+                                  </p:stCondLst>
+                                  <p:childTnLst>
+                                    <p:set>
+                                      <p:cBhvr>
+                                        <p:cTn id="23" dur="1" fill="hold">
+                                          <p:stCondLst>
+                                            <p:cond delay="0"/>
+                                          </p:stCondLst>
+                                        </p:cTn>
+                                        <p:tgtEl>
+                                          <p:spTgt spid="3">
+                                            <p:txEl>
+                                              <p:pRg st="8" end="8"/>
+                                            </p:txEl>
+                                          </p:spTgt>
+                                        </p:tgtEl>
+                                        <p:attrNameLst>
+                                          <p:attrName>style.visibility</p:attrName>
+                                        </p:attrNameLst>
+                                      </p:cBhvr>
+                                      <p:to>
+                                        <p:strVal val="visible"/>
+                                      </p:to>
+                                    </p:set>
+                                    <p:animEffect transition="in" filter="fade">
+                                      <p:cBhvr>
+                                        <p:cTn id="24" dur="500"/>
+                                        <p:tgtEl>
+                                          <p:spTgt spid="3">
+                                            <p:txEl>
+                                              <p:pRg st="8" end="8"/>
+                                            </p:txEl>
+                                          </p:spTgt>
+                                        </p:tgtEl>
+                                      </p:cBhvr>
+                                    </p:animEffect>
+                                  </p:childTnLst>
+                                </p:cTn>
+                              </p:par>
+                              <p:par>
+                                <p:cTn id="25" presetID="10" presetClass="entr" presetSubtype="0" fill="hold" nodeType="withEffect">
+                                  <p:stCondLst>
+                                    <p:cond delay="0"/>
+                                  </p:stCondLst>
+                                  <p:childTnLst>
+                                    <p:set>
+                                      <p:cBhvr>
+                                        <p:cTn id="26" dur="1" fill="hold">
+                                          <p:stCondLst>
+                                            <p:cond delay="0"/>
+                                          </p:stCondLst>
+                                        </p:cTn>
+                                        <p:tgtEl>
+                                          <p:spTgt spid="3">
+                                            <p:txEl>
+                                              <p:pRg st="9" end="9"/>
+                                            </p:txEl>
+                                          </p:spTgt>
+                                        </p:tgtEl>
+                                        <p:attrNameLst>
+                                          <p:attrName>style.visibility</p:attrName>
+                                        </p:attrNameLst>
+                                      </p:cBhvr>
+                                      <p:to>
+                                        <p:strVal val="visible"/>
+                                      </p:to>
+                                    </p:set>
+                                    <p:animEffect transition="in" filter="fade">
+                                      <p:cBhvr>
+                                        <p:cTn id="27" dur="500"/>
+                                        <p:tgtEl>
+                                          <p:spTgt spid="3">
+                                            <p:txEl>
+                                              <p:pRg st="9" end="9"/>
+                                            </p:txEl>
+                                          </p:spTgt>
+                                        </p:tgtEl>
+                                      </p:cBhvr>
+                                    </p:animEffect>
+                                  </p:childTnLst>
+                                </p:cTn>
+                              </p:par>
+                            </p:childTnLst>
+                          </p:cTn>
+                        </p:par>
+                      </p:childTnLst>
+                    </p:cTn>
+                  </p:par>
+                  <p:par>
+                    <p:cTn id="28" fill="hold">
+                      <p:stCondLst>
+                        <p:cond delay="indefinite"/>
+                      </p:stCondLst>
+                      <p:childTnLst>
+                        <p:par>
+                          <p:cTn id="29" fill="hold">
+                            <p:stCondLst>
+                              <p:cond delay="0"/>
+                            </p:stCondLst>
+                            <p:childTnLst>
+                              <p:par>
+                                <p:cTn id="30" presetID="10" presetClass="entr" presetSubtype="0" fill="hold" nodeType="clickEffect">
+                                  <p:stCondLst>
+                                    <p:cond delay="0"/>
+                                  </p:stCondLst>
+                                  <p:childTnLst>
+                                    <p:set>
+                                      <p:cBhvr>
+                                        <p:cTn id="31" dur="1" fill="hold">
+                                          <p:stCondLst>
+                                            <p:cond delay="0"/>
+                                          </p:stCondLst>
+                                        </p:cTn>
+                                        <p:tgtEl>
+                                          <p:spTgt spid="3">
+                                            <p:txEl>
+                                              <p:pRg st="12" end="12"/>
+                                            </p:txEl>
+                                          </p:spTgt>
+                                        </p:tgtEl>
+                                        <p:attrNameLst>
+                                          <p:attrName>style.visibility</p:attrName>
+                                        </p:attrNameLst>
+                                      </p:cBhvr>
+                                      <p:to>
+                                        <p:strVal val="visible"/>
+                                      </p:to>
+                                    </p:set>
+                                    <p:animEffect transition="in" filter="fade">
+                                      <p:cBhvr>
+                                        <p:cTn id="32" dur="500"/>
+                                        <p:tgtEl>
+                                          <p:spTgt spid="3">
+                                            <p:txEl>
+                                              <p:pRg st="12" end="12"/>
+                                            </p:txEl>
+                                          </p:spTgt>
+                                        </p:tgtEl>
+                                      </p:cBhvr>
+                                    </p:animEffect>
+                                  </p:childTnLst>
+                                </p:cTn>
+                              </p:par>
+                              <p:par>
+                                <p:cTn id="33" presetID="10" presetClass="entr" presetSubtype="0" fill="hold" nodeType="withEffect">
+                                  <p:stCondLst>
+                                    <p:cond delay="0"/>
+                                  </p:stCondLst>
+                                  <p:childTnLst>
+                                    <p:set>
+                                      <p:cBhvr>
+                                        <p:cTn id="34" dur="1" fill="hold">
+                                          <p:stCondLst>
+                                            <p:cond delay="0"/>
+                                          </p:stCondLst>
+                                        </p:cTn>
+                                        <p:tgtEl>
+                                          <p:spTgt spid="3">
+                                            <p:txEl>
+                                              <p:pRg st="13" end="13"/>
+                                            </p:txEl>
+                                          </p:spTgt>
+                                        </p:tgtEl>
+                                        <p:attrNameLst>
+                                          <p:attrName>style.visibility</p:attrName>
+                                        </p:attrNameLst>
+                                      </p:cBhvr>
+                                      <p:to>
+                                        <p:strVal val="visible"/>
+                                      </p:to>
+                                    </p:set>
+                                    <p:animEffect transition="in" filter="fade">
+                                      <p:cBhvr>
+                                        <p:cTn id="35" dur="500"/>
+                                        <p:tgtEl>
+                                          <p:spTgt spid="3">
+                                            <p:txEl>
+                                              <p:pRg st="13" end="13"/>
+                                            </p:txEl>
+                                          </p:spTgt>
+                                        </p:tgtEl>
+                                      </p:cBhvr>
+                                    </p:animEffect>
+                                  </p:childTnLst>
+                                </p:cTn>
+                              </p:par>
+                              <p:par>
+                                <p:cTn id="36" presetID="10" presetClass="entr" presetSubtype="0" fill="hold" nodeType="withEffect">
+                                  <p:stCondLst>
+                                    <p:cond delay="0"/>
+                                  </p:stCondLst>
+                                  <p:childTnLst>
+                                    <p:set>
+                                      <p:cBhvr>
+                                        <p:cTn id="37" dur="1" fill="hold">
+                                          <p:stCondLst>
+                                            <p:cond delay="0"/>
+                                          </p:stCondLst>
+                                        </p:cTn>
+                                        <p:tgtEl>
+                                          <p:spTgt spid="3">
+                                            <p:txEl>
+                                              <p:pRg st="14" end="14"/>
+                                            </p:txEl>
+                                          </p:spTgt>
+                                        </p:tgtEl>
+                                        <p:attrNameLst>
+                                          <p:attrName>style.visibility</p:attrName>
+                                        </p:attrNameLst>
+                                      </p:cBhvr>
+                                      <p:to>
+                                        <p:strVal val="visible"/>
+                                      </p:to>
+                                    </p:set>
+                                    <p:animEffect transition="in" filter="fade">
+                                      <p:cBhvr>
+                                        <p:cTn id="38" dur="500"/>
+                                        <p:tgtEl>
+                                          <p:spTgt spid="3">
+                                            <p:txEl>
+                                              <p:pRg st="14" end="14"/>
+                                            </p:txEl>
+                                          </p:spTgt>
+                                        </p:tgtEl>
+                                      </p:cBhvr>
+                                    </p:animEffect>
+                                  </p:childTnLst>
+                                </p:cTn>
+                              </p:par>
+                            </p:childTnLst>
+                          </p:cTn>
+                        </p:par>
+                      </p:childTnLst>
+                    </p:cTn>
+                  </p:par>
+                </p:childTnLst>
+              </p:cTn>
+              <p:prevCondLst>
+                <p:cond evt="onPrev" delay="0">
+                  <p:tgtEl>
+                    <p:sldTgt/>
+                  </p:tgtEl>
+                </p:cond>
+              </p:prevCondLst>
+              <p:nextCondLst>
+                <p:cond evt="onNext" delay="0">
+                  <p:tgtEl>
+                    <p:sldTgt/>
+                  </p:tgtEl>
+                </p:cond>
+              </p:nextCondLst>
+            </p:seq>
+          </p:childTnLst>
+        </p:cTn>
       </p:par>
     </p:tnLst>
   </p:timing>

</xml_diff>